<commit_message>
Atualizando a apresentacao e README
</commit_message>
<xml_diff>
--- a/minikube-lab.pptx
+++ b/minikube-lab.pptx
@@ -5354,10 +5354,10 @@
       </p:sp>
       <p:pic>
         <p:nvPicPr>
-          <p:cNvPr id="1026" name="Picture 2">
-            <a:extLst>
-              <a:ext uri="{FF2B5EF4-FFF2-40B4-BE49-F238E27FC236}">
-                <a16:creationId xmlns:a16="http://schemas.microsoft.com/office/drawing/2014/main" id="{0F844F71-015E-45C2-9D32-B3110BD53ACB}"/>
+          <p:cNvPr id="1030" name="Picture 6">
+            <a:extLst>
+              <a:ext uri="{FF2B5EF4-FFF2-40B4-BE49-F238E27FC236}">
+                <a16:creationId xmlns:a16="http://schemas.microsoft.com/office/drawing/2014/main" id="{D936D088-7096-43ED-AB2B-BE9D832CAC22}"/>
               </a:ext>
             </a:extLst>
           </p:cNvPr>
@@ -5368,53 +5368,6 @@
         </p:nvPicPr>
         <p:blipFill>
           <a:blip r:embed="rId2">
-            <a:extLst>
-              <a:ext uri="{28A0092B-C50C-407E-A947-70E740481C1C}">
-                <a14:useLocalDpi xmlns:a14="http://schemas.microsoft.com/office/drawing/2010/main" val="0"/>
-              </a:ext>
-            </a:extLst>
-          </a:blip>
-          <a:srcRect/>
-          <a:stretch>
-            <a:fillRect/>
-          </a:stretch>
-        </p:blipFill>
-        <p:spPr bwMode="auto">
-          <a:xfrm>
-            <a:off x="3942960" y="339364"/>
-            <a:ext cx="3790950" cy="752475"/>
-          </a:xfrm>
-          <a:prstGeom prst="rect">
-            <a:avLst/>
-          </a:prstGeom>
-          <a:noFill/>
-          <a:extLst>
-            <a:ext uri="{909E8E84-426E-40DD-AFC4-6F175D3DCCD1}">
-              <a14:hiddenFill xmlns:a14="http://schemas.microsoft.com/office/drawing/2010/main">
-                <a:solidFill>
-                  <a:srgbClr val="FFFFFF"/>
-                </a:solidFill>
-              </a14:hiddenFill>
-            </a:ext>
-          </a:extLst>
-        </p:spPr>
-      </p:pic>
-      <p:pic>
-        <p:nvPicPr>
-          <p:cNvPr id="1030" name="Picture 6">
-            <a:extLst>
-              <a:ext uri="{FF2B5EF4-FFF2-40B4-BE49-F238E27FC236}">
-                <a16:creationId xmlns:a16="http://schemas.microsoft.com/office/drawing/2014/main" id="{D936D088-7096-43ED-AB2B-BE9D832CAC22}"/>
-              </a:ext>
-            </a:extLst>
-          </p:cNvPr>
-          <p:cNvPicPr>
-            <a:picLocks noChangeAspect="1" noChangeArrowheads="1"/>
-          </p:cNvPicPr>
-          <p:nvPr/>
-        </p:nvPicPr>
-        <p:blipFill>
-          <a:blip r:embed="rId3">
             <a:extLst>
               <a:ext uri="{28A0092B-C50C-407E-A947-70E740481C1C}">
                 <a14:useLocalDpi xmlns:a14="http://schemas.microsoft.com/office/drawing/2010/main" val="0"/>

</xml_diff>

<commit_message>
Adicionando link do repositorio ao PPT
</commit_message>
<xml_diff>
--- a/minikube-lab.pptx
+++ b/minikube-lab.pptx
@@ -5,7 +5,7 @@
     <p:sldMasterId id="2147483648" r:id="rId1"/>
   </p:sldMasterIdLst>
   <p:notesMasterIdLst>
-    <p:notesMasterId r:id="rId12"/>
+    <p:notesMasterId r:id="rId9"/>
   </p:notesMasterIdLst>
   <p:sldIdLst>
     <p:sldId id="256" r:id="rId2"/>
@@ -14,10 +14,7 @@
     <p:sldId id="263" r:id="rId5"/>
     <p:sldId id="269" r:id="rId6"/>
     <p:sldId id="258" r:id="rId7"/>
-    <p:sldId id="262" r:id="rId8"/>
-    <p:sldId id="268" r:id="rId9"/>
-    <p:sldId id="267" r:id="rId10"/>
-    <p:sldId id="259" r:id="rId11"/>
+    <p:sldId id="270" r:id="rId8"/>
   </p:sldIdLst>
   <p:sldSz cx="12192000" cy="6858000"/>
   <p:notesSz cx="6858000" cy="9144000"/>
@@ -912,20 +909,6 @@
 </pc:chgInfo>
 </file>
 
-<file path=ppt/comments/comment1.xml><?xml version="1.0" encoding="utf-8"?>
-<p:cmLst xmlns:a="http://schemas.openxmlformats.org/drawingml/2006/main" xmlns:r="http://schemas.openxmlformats.org/officeDocument/2006/relationships" xmlns:p="http://schemas.openxmlformats.org/presentationml/2006/main">
-  <p:cm authorId="1" dt="2019-09-27T23:35:06.080" idx="1">
-    <p:pos x="10" y="10"/>
-    <p:text/>
-    <p:extLst>
-      <p:ext uri="{C676402C-5697-4E1C-873F-D02D1690AC5C}">
-        <p15:threadingInfo xmlns:p15="http://schemas.microsoft.com/office/powerpoint/2012/main" timeZoneBias="180"/>
-      </p:ext>
-    </p:extLst>
-  </p:cm>
-</p:cmLst>
-</file>
-
 <file path=ppt/notesMasters/notesMaster1.xml><?xml version="1.0" encoding="utf-8"?>
 <p:notesMaster xmlns:a="http://schemas.openxmlformats.org/drawingml/2006/main" xmlns:r="http://schemas.openxmlformats.org/officeDocument/2006/relationships" xmlns:p="http://schemas.openxmlformats.org/presentationml/2006/main">
   <p:cSld>
@@ -1008,7 +991,7 @@
           <a:p>
             <a:fld id="{967D428A-7AE7-4B1C-AC83-C800B6288DB2}" type="datetimeFigureOut">
               <a:rPr lang="en-US" smtClean="0"/>
-              <a:t>9/28/2019</a:t>
+              <a:t>10/9/2019</a:t>
             </a:fld>
             <a:endParaRPr lang="en-US"/>
           </a:p>
@@ -1167,7 +1150,7 @@
           <a:p>
             <a:fld id="{82FFED7E-E631-4D36-BE55-D03C295807C7}" type="slidenum">
               <a:rPr lang="en-US" smtClean="0"/>
-              <a:t>‹nº›</a:t>
+              <a:t>‹#›</a:t>
             </a:fld>
             <a:endParaRPr lang="en-US"/>
           </a:p>
@@ -1662,22 +1645,66 @@
           <a:lstStyle/>
           <a:p>
             <a:r>
+              <a:rPr lang="pt-BR" dirty="0"/>
+              <a:t>O </a:t>
+            </a:r>
+            <a:r>
               <a:rPr lang="pt-BR" dirty="0" err="1"/>
-              <a:t>Chocolatey</a:t>
+              <a:t>Minikube</a:t>
             </a:r>
             <a:r>
               <a:rPr lang="pt-BR" dirty="0"/>
-              <a:t>, gerenciador de pacotes para Windows</a:t>
-            </a:r>
-          </a:p>
-          <a:p>
+              <a:t> é uma ferramenta que facilita executar o </a:t>
+            </a:r>
+            <a:r>
+              <a:rPr lang="pt-BR" dirty="0" err="1"/>
+              <a:t>Kubernetes</a:t>
+            </a:r>
             <a:r>
               <a:rPr lang="pt-BR" dirty="0"/>
-              <a:t>Auxiliar na montagem do ambiente para os interessados em executar o </a:t>
+              <a:t> localmente, executando um cluster de </a:t>
             </a:r>
             <a:r>
               <a:rPr lang="pt-BR" dirty="0" err="1"/>
-              <a:t>lab</a:t>
+              <a:t>Kubernetes</a:t>
+            </a:r>
+            <a:r>
+              <a:rPr lang="pt-BR" dirty="0"/>
+              <a:t> com um único nó.</a:t>
+            </a:r>
+          </a:p>
+          <a:p>
+            <a:r>
+              <a:rPr lang="pt-BR" dirty="0"/>
+              <a:t>E possível recriar todo o ambiente quando necessário.</a:t>
+            </a:r>
+          </a:p>
+          <a:p>
+            <a:r>
+              <a:rPr lang="pt-BR" dirty="0"/>
+              <a:t>Também e possível selecionar a versão do </a:t>
+            </a:r>
+            <a:r>
+              <a:rPr lang="pt-BR" dirty="0" err="1"/>
+              <a:t>kubernetes</a:t>
+            </a:r>
+            <a:r>
+              <a:rPr lang="pt-BR" dirty="0"/>
+              <a:t> que será utilizada</a:t>
+            </a:r>
+          </a:p>
+          <a:p>
+            <a:r>
+              <a:rPr lang="pt-BR" dirty="0"/>
+              <a:t>Ele não descarta a necessidade de utilizar o Docker para build e </a:t>
+            </a:r>
+            <a:r>
+              <a:rPr lang="pt-BR" dirty="0" err="1"/>
+              <a:t>pull</a:t>
+            </a:r>
+            <a:r>
+              <a:rPr lang="pt-BR" dirty="0"/>
+              <a:t> de imagens</a:t>
             </a:r>
             <a:endParaRPr lang="en-US" dirty="0"/>
           </a:p>
@@ -1709,249 +1736,7 @@
     </p:spTree>
     <p:extLst>
       <p:ext uri="{BB962C8B-B14F-4D97-AF65-F5344CB8AC3E}">
-        <p14:creationId xmlns:p14="http://schemas.microsoft.com/office/powerpoint/2010/main" val="771984121"/>
-      </p:ext>
-    </p:extLst>
-  </p:cSld>
-  <p:clrMapOvr>
-    <a:masterClrMapping/>
-  </p:clrMapOvr>
-</p:notes>
-</file>
-
-<file path=ppt/notesSlides/notesSlide5.xml><?xml version="1.0" encoding="utf-8"?>
-<p:notes xmlns:a="http://schemas.openxmlformats.org/drawingml/2006/main" xmlns:r="http://schemas.openxmlformats.org/officeDocument/2006/relationships" xmlns:p="http://schemas.openxmlformats.org/presentationml/2006/main">
-  <p:cSld>
-    <p:spTree>
-      <p:nvGrpSpPr>
-        <p:cNvPr id="1" name=""/>
-        <p:cNvGrpSpPr/>
-        <p:nvPr/>
-      </p:nvGrpSpPr>
-      <p:grpSpPr>
-        <a:xfrm>
-          <a:off x="0" y="0"/>
-          <a:ext cx="0" cy="0"/>
-          <a:chOff x="0" y="0"/>
-          <a:chExt cx="0" cy="0"/>
-        </a:xfrm>
-      </p:grpSpPr>
-      <p:sp>
-        <p:nvSpPr>
-          <p:cNvPr id="2" name="Espaço Reservado para Imagem de Slide 1"/>
-          <p:cNvSpPr>
-            <a:spLocks noGrp="1" noRot="1" noChangeAspect="1"/>
-          </p:cNvSpPr>
-          <p:nvPr>
-            <p:ph type="sldImg"/>
-          </p:nvPr>
-        </p:nvSpPr>
-        <p:spPr/>
-      </p:sp>
-      <p:sp>
-        <p:nvSpPr>
-          <p:cNvPr id="3" name="Espaço Reservado para Anotações 2"/>
-          <p:cNvSpPr>
-            <a:spLocks noGrp="1"/>
-          </p:cNvSpPr>
-          <p:nvPr>
-            <p:ph type="body" idx="1"/>
-          </p:nvPr>
-        </p:nvSpPr>
-        <p:spPr/>
-        <p:txBody>
-          <a:bodyPr/>
-          <a:lstStyle/>
-          <a:p>
-            <a:r>
-              <a:rPr lang="pt-BR" dirty="0"/>
-              <a:t>Caso haja problemas verificar a versão do </a:t>
-            </a:r>
-            <a:r>
-              <a:rPr lang="pt-BR" dirty="0" err="1"/>
-              <a:t>minikube</a:t>
-            </a:r>
-            <a:r>
-              <a:rPr lang="pt-BR" dirty="0"/>
-              <a:t> instalada.</a:t>
-            </a:r>
-          </a:p>
-          <a:p>
-            <a:endParaRPr lang="en-US" dirty="0"/>
-          </a:p>
-        </p:txBody>
-      </p:sp>
-      <p:sp>
-        <p:nvSpPr>
-          <p:cNvPr id="4" name="Espaço Reservado para Número de Slide 3"/>
-          <p:cNvSpPr>
-            <a:spLocks noGrp="1"/>
-          </p:cNvSpPr>
-          <p:nvPr>
-            <p:ph type="sldNum" sz="quarter" idx="5"/>
-          </p:nvPr>
-        </p:nvSpPr>
-        <p:spPr/>
-        <p:txBody>
-          <a:bodyPr/>
-          <a:lstStyle/>
-          <a:p>
-            <a:fld id="{82FFED7E-E631-4D36-BE55-D03C295807C7}" type="slidenum">
-              <a:rPr lang="en-US" smtClean="0"/>
-              <a:t>9</a:t>
-            </a:fld>
-            <a:endParaRPr lang="en-US"/>
-          </a:p>
-        </p:txBody>
-      </p:sp>
-    </p:spTree>
-    <p:extLst>
-      <p:ext uri="{BB962C8B-B14F-4D97-AF65-F5344CB8AC3E}">
-        <p14:creationId xmlns:p14="http://schemas.microsoft.com/office/powerpoint/2010/main" val="4269149205"/>
-      </p:ext>
-    </p:extLst>
-  </p:cSld>
-  <p:clrMapOvr>
-    <a:masterClrMapping/>
-  </p:clrMapOvr>
-</p:notes>
-</file>
-
-<file path=ppt/notesSlides/notesSlide6.xml><?xml version="1.0" encoding="utf-8"?>
-<p:notes xmlns:a="http://schemas.openxmlformats.org/drawingml/2006/main" xmlns:r="http://schemas.openxmlformats.org/officeDocument/2006/relationships" xmlns:p="http://schemas.openxmlformats.org/presentationml/2006/main">
-  <p:cSld>
-    <p:spTree>
-      <p:nvGrpSpPr>
-        <p:cNvPr id="1" name=""/>
-        <p:cNvGrpSpPr/>
-        <p:nvPr/>
-      </p:nvGrpSpPr>
-      <p:grpSpPr>
-        <a:xfrm>
-          <a:off x="0" y="0"/>
-          <a:ext cx="0" cy="0"/>
-          <a:chOff x="0" y="0"/>
-          <a:chExt cx="0" cy="0"/>
-        </a:xfrm>
-      </p:grpSpPr>
-      <p:sp>
-        <p:nvSpPr>
-          <p:cNvPr id="2" name="Espaço Reservado para Imagem de Slide 1"/>
-          <p:cNvSpPr>
-            <a:spLocks noGrp="1" noRot="1" noChangeAspect="1"/>
-          </p:cNvSpPr>
-          <p:nvPr>
-            <p:ph type="sldImg"/>
-          </p:nvPr>
-        </p:nvSpPr>
-        <p:spPr/>
-      </p:sp>
-      <p:sp>
-        <p:nvSpPr>
-          <p:cNvPr id="3" name="Espaço Reservado para Anotações 2"/>
-          <p:cNvSpPr>
-            <a:spLocks noGrp="1"/>
-          </p:cNvSpPr>
-          <p:nvPr>
-            <p:ph type="body" idx="1"/>
-          </p:nvPr>
-        </p:nvSpPr>
-        <p:spPr/>
-        <p:txBody>
-          <a:bodyPr/>
-          <a:lstStyle/>
-          <a:p>
-            <a:r>
-              <a:rPr lang="pt-BR" dirty="0"/>
-              <a:t>Confirmar todos os interessados se estão com o ambiente rodando</a:t>
-            </a:r>
-          </a:p>
-          <a:p>
-            <a:r>
-              <a:rPr lang="pt-BR" dirty="0"/>
-              <a:t>Comandos</a:t>
-            </a:r>
-          </a:p>
-          <a:p>
-            <a:r>
-              <a:rPr lang="pt-BR" dirty="0" err="1"/>
-              <a:t>minikube</a:t>
-            </a:r>
-            <a:r>
-              <a:rPr lang="pt-BR" dirty="0"/>
-              <a:t> status</a:t>
-            </a:r>
-          </a:p>
-          <a:p>
-            <a:r>
-              <a:rPr lang="pt-BR" dirty="0" err="1"/>
-              <a:t>Kubectl</a:t>
-            </a:r>
-            <a:r>
-              <a:rPr lang="pt-BR" dirty="0"/>
-              <a:t> </a:t>
-            </a:r>
-            <a:r>
-              <a:rPr lang="pt-BR" dirty="0" err="1"/>
-              <a:t>version</a:t>
-            </a:r>
-            <a:endParaRPr lang="pt-BR" dirty="0"/>
-          </a:p>
-          <a:p>
-            <a:r>
-              <a:rPr lang="pt-BR" dirty="0" err="1"/>
-              <a:t>Kubectl</a:t>
-            </a:r>
-            <a:r>
-              <a:rPr lang="pt-BR" dirty="0"/>
-              <a:t> </a:t>
-            </a:r>
-            <a:r>
-              <a:rPr lang="pt-BR" dirty="0" err="1"/>
-              <a:t>config</a:t>
-            </a:r>
-            <a:r>
-              <a:rPr lang="pt-BR" dirty="0"/>
-              <a:t> </a:t>
-            </a:r>
-            <a:r>
-              <a:rPr lang="pt-BR" dirty="0" err="1"/>
-              <a:t>view</a:t>
-            </a:r>
-            <a:endParaRPr lang="pt-BR" dirty="0"/>
-          </a:p>
-          <a:p>
-            <a:endParaRPr lang="en-US" dirty="0"/>
-          </a:p>
-        </p:txBody>
-      </p:sp>
-      <p:sp>
-        <p:nvSpPr>
-          <p:cNvPr id="4" name="Espaço Reservado para Número de Slide 3"/>
-          <p:cNvSpPr>
-            <a:spLocks noGrp="1"/>
-          </p:cNvSpPr>
-          <p:nvPr>
-            <p:ph type="sldNum" sz="quarter" idx="5"/>
-          </p:nvPr>
-        </p:nvSpPr>
-        <p:spPr/>
-        <p:txBody>
-          <a:bodyPr/>
-          <a:lstStyle/>
-          <a:p>
-            <a:fld id="{82FFED7E-E631-4D36-BE55-D03C295807C7}" type="slidenum">
-              <a:rPr lang="en-US" smtClean="0"/>
-              <a:t>10</a:t>
-            </a:fld>
-            <a:endParaRPr lang="en-US"/>
-          </a:p>
-        </p:txBody>
-      </p:sp>
-    </p:spTree>
-    <p:extLst>
-      <p:ext uri="{BB962C8B-B14F-4D97-AF65-F5344CB8AC3E}">
-        <p14:creationId xmlns:p14="http://schemas.microsoft.com/office/powerpoint/2010/main" val="2893737575"/>
+        <p14:creationId xmlns:p14="http://schemas.microsoft.com/office/powerpoint/2010/main" val="1053939913"/>
       </p:ext>
     </p:extLst>
   </p:cSld>
@@ -2108,7 +1893,7 @@
           <a:p>
             <a:fld id="{91D69532-3C03-4717-A339-5719AD6E2E61}" type="datetimeFigureOut">
               <a:rPr lang="en-US" smtClean="0"/>
-              <a:t>9/28/2019</a:t>
+              <a:t>10/9/2019</a:t>
             </a:fld>
             <a:endParaRPr lang="en-US"/>
           </a:p>
@@ -2162,7 +1947,7 @@
           <a:p>
             <a:fld id="{484AC2C6-DCEA-4D3D-A929-9066560F19D8}" type="slidenum">
               <a:rPr lang="en-US" smtClean="0"/>
-              <a:t>‹nº›</a:t>
+              <a:t>‹#›</a:t>
             </a:fld>
             <a:endParaRPr lang="en-US"/>
           </a:p>
@@ -2306,7 +2091,7 @@
           <a:p>
             <a:fld id="{91D69532-3C03-4717-A339-5719AD6E2E61}" type="datetimeFigureOut">
               <a:rPr lang="en-US" smtClean="0"/>
-              <a:t>9/28/2019</a:t>
+              <a:t>10/9/2019</a:t>
             </a:fld>
             <a:endParaRPr lang="en-US"/>
           </a:p>
@@ -2360,7 +2145,7 @@
           <a:p>
             <a:fld id="{484AC2C6-DCEA-4D3D-A929-9066560F19D8}" type="slidenum">
               <a:rPr lang="en-US" smtClean="0"/>
-              <a:t>‹nº›</a:t>
+              <a:t>‹#›</a:t>
             </a:fld>
             <a:endParaRPr lang="en-US"/>
           </a:p>
@@ -2514,7 +2299,7 @@
           <a:p>
             <a:fld id="{91D69532-3C03-4717-A339-5719AD6E2E61}" type="datetimeFigureOut">
               <a:rPr lang="en-US" smtClean="0"/>
-              <a:t>9/28/2019</a:t>
+              <a:t>10/9/2019</a:t>
             </a:fld>
             <a:endParaRPr lang="en-US"/>
           </a:p>
@@ -2568,7 +2353,7 @@
           <a:p>
             <a:fld id="{484AC2C6-DCEA-4D3D-A929-9066560F19D8}" type="slidenum">
               <a:rPr lang="en-US" smtClean="0"/>
-              <a:t>‹nº›</a:t>
+              <a:t>‹#›</a:t>
             </a:fld>
             <a:endParaRPr lang="en-US"/>
           </a:p>
@@ -2712,7 +2497,7 @@
           <a:p>
             <a:fld id="{91D69532-3C03-4717-A339-5719AD6E2E61}" type="datetimeFigureOut">
               <a:rPr lang="en-US" smtClean="0"/>
-              <a:t>9/28/2019</a:t>
+              <a:t>10/9/2019</a:t>
             </a:fld>
             <a:endParaRPr lang="en-US"/>
           </a:p>
@@ -2766,7 +2551,7 @@
           <a:p>
             <a:fld id="{484AC2C6-DCEA-4D3D-A929-9066560F19D8}" type="slidenum">
               <a:rPr lang="en-US" smtClean="0"/>
-              <a:t>‹nº›</a:t>
+              <a:t>‹#›</a:t>
             </a:fld>
             <a:endParaRPr lang="en-US"/>
           </a:p>
@@ -2987,7 +2772,7 @@
           <a:p>
             <a:fld id="{91D69532-3C03-4717-A339-5719AD6E2E61}" type="datetimeFigureOut">
               <a:rPr lang="en-US" smtClean="0"/>
-              <a:t>9/28/2019</a:t>
+              <a:t>10/9/2019</a:t>
             </a:fld>
             <a:endParaRPr lang="en-US"/>
           </a:p>
@@ -3041,7 +2826,7 @@
           <a:p>
             <a:fld id="{484AC2C6-DCEA-4D3D-A929-9066560F19D8}" type="slidenum">
               <a:rPr lang="en-US" smtClean="0"/>
-              <a:t>‹nº›</a:t>
+              <a:t>‹#›</a:t>
             </a:fld>
             <a:endParaRPr lang="en-US"/>
           </a:p>
@@ -3252,7 +3037,7 @@
           <a:p>
             <a:fld id="{91D69532-3C03-4717-A339-5719AD6E2E61}" type="datetimeFigureOut">
               <a:rPr lang="en-US" smtClean="0"/>
-              <a:t>9/28/2019</a:t>
+              <a:t>10/9/2019</a:t>
             </a:fld>
             <a:endParaRPr lang="en-US"/>
           </a:p>
@@ -3306,7 +3091,7 @@
           <a:p>
             <a:fld id="{484AC2C6-DCEA-4D3D-A929-9066560F19D8}" type="slidenum">
               <a:rPr lang="en-US" smtClean="0"/>
-              <a:t>‹nº›</a:t>
+              <a:t>‹#›</a:t>
             </a:fld>
             <a:endParaRPr lang="en-US"/>
           </a:p>
@@ -3664,7 +3449,7 @@
           <a:p>
             <a:fld id="{91D69532-3C03-4717-A339-5719AD6E2E61}" type="datetimeFigureOut">
               <a:rPr lang="en-US" smtClean="0"/>
-              <a:t>9/28/2019</a:t>
+              <a:t>10/9/2019</a:t>
             </a:fld>
             <a:endParaRPr lang="en-US"/>
           </a:p>
@@ -3718,7 +3503,7 @@
           <a:p>
             <a:fld id="{484AC2C6-DCEA-4D3D-A929-9066560F19D8}" type="slidenum">
               <a:rPr lang="en-US" smtClean="0"/>
-              <a:t>‹nº›</a:t>
+              <a:t>‹#›</a:t>
             </a:fld>
             <a:endParaRPr lang="en-US"/>
           </a:p>
@@ -3805,7 +3590,7 @@
           <a:p>
             <a:fld id="{91D69532-3C03-4717-A339-5719AD6E2E61}" type="datetimeFigureOut">
               <a:rPr lang="en-US" smtClean="0"/>
-              <a:t>9/28/2019</a:t>
+              <a:t>10/9/2019</a:t>
             </a:fld>
             <a:endParaRPr lang="en-US"/>
           </a:p>
@@ -3859,7 +3644,7 @@
           <a:p>
             <a:fld id="{484AC2C6-DCEA-4D3D-A929-9066560F19D8}" type="slidenum">
               <a:rPr lang="en-US" smtClean="0"/>
-              <a:t>‹nº›</a:t>
+              <a:t>‹#›</a:t>
             </a:fld>
             <a:endParaRPr lang="en-US"/>
           </a:p>
@@ -3918,7 +3703,7 @@
           <a:p>
             <a:fld id="{91D69532-3C03-4717-A339-5719AD6E2E61}" type="datetimeFigureOut">
               <a:rPr lang="en-US" smtClean="0"/>
-              <a:t>9/28/2019</a:t>
+              <a:t>10/9/2019</a:t>
             </a:fld>
             <a:endParaRPr lang="en-US"/>
           </a:p>
@@ -3972,7 +3757,7 @@
           <a:p>
             <a:fld id="{484AC2C6-DCEA-4D3D-A929-9066560F19D8}" type="slidenum">
               <a:rPr lang="en-US" smtClean="0"/>
-              <a:t>‹nº›</a:t>
+              <a:t>‹#›</a:t>
             </a:fld>
             <a:endParaRPr lang="en-US"/>
           </a:p>
@@ -4229,7 +4014,7 @@
           <a:p>
             <a:fld id="{91D69532-3C03-4717-A339-5719AD6E2E61}" type="datetimeFigureOut">
               <a:rPr lang="en-US" smtClean="0"/>
-              <a:t>9/28/2019</a:t>
+              <a:t>10/9/2019</a:t>
             </a:fld>
             <a:endParaRPr lang="en-US"/>
           </a:p>
@@ -4283,7 +4068,7 @@
           <a:p>
             <a:fld id="{484AC2C6-DCEA-4D3D-A929-9066560F19D8}" type="slidenum">
               <a:rPr lang="en-US" smtClean="0"/>
-              <a:t>‹nº›</a:t>
+              <a:t>‹#›</a:t>
             </a:fld>
             <a:endParaRPr lang="en-US"/>
           </a:p>
@@ -4517,7 +4302,7 @@
           <a:p>
             <a:fld id="{91D69532-3C03-4717-A339-5719AD6E2E61}" type="datetimeFigureOut">
               <a:rPr lang="en-US" smtClean="0"/>
-              <a:t>9/28/2019</a:t>
+              <a:t>10/9/2019</a:t>
             </a:fld>
             <a:endParaRPr lang="en-US"/>
           </a:p>
@@ -4571,7 +4356,7 @@
           <a:p>
             <a:fld id="{484AC2C6-DCEA-4D3D-A929-9066560F19D8}" type="slidenum">
               <a:rPr lang="en-US" smtClean="0"/>
-              <a:t>‹nº›</a:t>
+              <a:t>‹#›</a:t>
             </a:fld>
             <a:endParaRPr lang="en-US"/>
           </a:p>
@@ -4768,7 +4553,7 @@
           <a:p>
             <a:fld id="{91D69532-3C03-4717-A339-5719AD6E2E61}" type="datetimeFigureOut">
               <a:rPr lang="en-US" smtClean="0"/>
-              <a:t>9/28/2019</a:t>
+              <a:t>10/9/2019</a:t>
             </a:fld>
             <a:endParaRPr lang="en-US"/>
           </a:p>
@@ -4858,7 +4643,7 @@
           <a:p>
             <a:fld id="{484AC2C6-DCEA-4D3D-A929-9066560F19D8}" type="slidenum">
               <a:rPr lang="en-US" smtClean="0"/>
-              <a:t>‹nº›</a:t>
+              <a:t>‹#›</a:t>
             </a:fld>
             <a:endParaRPr lang="en-US"/>
           </a:p>
@@ -5419,83 +5204,6 @@
 </p:sld>
 </file>
 
-<file path=ppt/slides/slide10.xml><?xml version="1.0" encoding="utf-8"?>
-<p:sld xmlns:a="http://schemas.openxmlformats.org/drawingml/2006/main" xmlns:r="http://schemas.openxmlformats.org/officeDocument/2006/relationships" xmlns:p="http://schemas.openxmlformats.org/presentationml/2006/main">
-  <p:cSld>
-    <p:spTree>
-      <p:nvGrpSpPr>
-        <p:cNvPr id="1" name=""/>
-        <p:cNvGrpSpPr/>
-        <p:nvPr/>
-      </p:nvGrpSpPr>
-      <p:grpSpPr>
-        <a:xfrm>
-          <a:off x="0" y="0"/>
-          <a:ext cx="0" cy="0"/>
-          <a:chOff x="0" y="0"/>
-          <a:chExt cx="0" cy="0"/>
-        </a:xfrm>
-      </p:grpSpPr>
-      <p:pic>
-        <p:nvPicPr>
-          <p:cNvPr id="3074" name="Picture 2">
-            <a:extLst>
-              <a:ext uri="{FF2B5EF4-FFF2-40B4-BE49-F238E27FC236}">
-                <a16:creationId xmlns:a16="http://schemas.microsoft.com/office/drawing/2014/main" id="{2E9E785E-21CD-4F55-937B-C73D37C02D39}"/>
-              </a:ext>
-            </a:extLst>
-          </p:cNvPr>
-          <p:cNvPicPr>
-            <a:picLocks noChangeAspect="1" noChangeArrowheads="1"/>
-          </p:cNvPicPr>
-          <p:nvPr/>
-        </p:nvPicPr>
-        <p:blipFill>
-          <a:blip r:embed="rId3">
-            <a:extLst>
-              <a:ext uri="{28A0092B-C50C-407E-A947-70E740481C1C}">
-                <a14:useLocalDpi xmlns:a14="http://schemas.microsoft.com/office/drawing/2010/main" val="0"/>
-              </a:ext>
-            </a:extLst>
-          </a:blip>
-          <a:srcRect/>
-          <a:stretch>
-            <a:fillRect/>
-          </a:stretch>
-        </p:blipFill>
-        <p:spPr bwMode="auto">
-          <a:xfrm>
-            <a:off x="990600" y="650081"/>
-            <a:ext cx="9880600" cy="5557838"/>
-          </a:xfrm>
-          <a:prstGeom prst="rect">
-            <a:avLst/>
-          </a:prstGeom>
-          <a:noFill/>
-          <a:extLst>
-            <a:ext uri="{909E8E84-426E-40DD-AFC4-6F175D3DCCD1}">
-              <a14:hiddenFill xmlns:a14="http://schemas.microsoft.com/office/drawing/2010/main">
-                <a:solidFill>
-                  <a:srgbClr val="FFFFFF"/>
-                </a:solidFill>
-              </a14:hiddenFill>
-            </a:ext>
-          </a:extLst>
-        </p:spPr>
-      </p:pic>
-    </p:spTree>
-    <p:extLst>
-      <p:ext uri="{BB962C8B-B14F-4D97-AF65-F5344CB8AC3E}">
-        <p14:creationId xmlns:p14="http://schemas.microsoft.com/office/powerpoint/2010/main" val="2443253487"/>
-      </p:ext>
-    </p:extLst>
-  </p:cSld>
-  <p:clrMapOvr>
-    <a:masterClrMapping/>
-  </p:clrMapOvr>
-</p:sld>
-</file>
-
 <file path=ppt/slides/slide2.xml><?xml version="1.0" encoding="utf-8"?>
 <p:sld xmlns:a="http://schemas.openxmlformats.org/drawingml/2006/main" xmlns:r="http://schemas.openxmlformats.org/officeDocument/2006/relationships" xmlns:p="http://schemas.openxmlformats.org/presentationml/2006/main">
   <p:cSld>
@@ -6582,186 +6290,55 @@
       </p:grpSpPr>
       <p:sp>
         <p:nvSpPr>
-          <p:cNvPr id="2" name="Título 1">
-            <a:extLst>
-              <a:ext uri="{FF2B5EF4-FFF2-40B4-BE49-F238E27FC236}">
-                <a16:creationId xmlns:a16="http://schemas.microsoft.com/office/drawing/2014/main" id="{DBFCB918-A046-49AA-85F0-0A52D9B0FA38}"/>
-              </a:ext>
-            </a:extLst>
-          </p:cNvPr>
-          <p:cNvSpPr>
-            <a:spLocks noGrp="1"/>
-          </p:cNvSpPr>
-          <p:nvPr>
-            <p:ph type="title"/>
-          </p:nvPr>
+          <p:cNvPr id="2" name="TextBox 1">
+            <a:extLst>
+              <a:ext uri="{FF2B5EF4-FFF2-40B4-BE49-F238E27FC236}">
+                <a16:creationId xmlns:a16="http://schemas.microsoft.com/office/drawing/2014/main" id="{A6B27D75-26E0-421F-B636-EF258C2EDFAA}"/>
+              </a:ext>
+            </a:extLst>
+          </p:cNvPr>
+          <p:cNvSpPr txBox="1"/>
+          <p:nvPr/>
         </p:nvSpPr>
         <p:spPr>
           <a:xfrm>
-            <a:off x="838200" y="365125"/>
-            <a:ext cx="10515600" cy="1325563"/>
+            <a:off x="788426" y="2782669"/>
+            <a:ext cx="10615150" cy="2123658"/>
           </a:xfrm>
+          <a:prstGeom prst="rect">
+            <a:avLst/>
+          </a:prstGeom>
+          <a:noFill/>
         </p:spPr>
         <p:txBody>
-          <a:bodyPr/>
-          <a:lstStyle/>
-          <a:p>
-            <a:r>
-              <a:rPr lang="pt-BR" dirty="0">
-                <a:solidFill>
-                  <a:schemeClr val="bg1"/>
-                </a:solidFill>
-                <a:latin typeface="Arial Black" panose="020B0A04020102020204" pitchFamily="34" charset="0"/>
-              </a:rPr>
-              <a:t>Pré-requisitos para o </a:t>
-            </a:r>
-            <a:r>
-              <a:rPr lang="pt-BR" dirty="0" err="1">
-                <a:solidFill>
-                  <a:schemeClr val="bg1"/>
-                </a:solidFill>
-                <a:latin typeface="Arial Black" panose="020B0A04020102020204" pitchFamily="34" charset="0"/>
-              </a:rPr>
-              <a:t>lab</a:t>
-            </a:r>
-            <a:endParaRPr lang="en-US" dirty="0"/>
-          </a:p>
-        </p:txBody>
-      </p:sp>
-      <p:sp>
-        <p:nvSpPr>
-          <p:cNvPr id="3" name="Espaço Reservado para Conteúdo 2">
-            <a:extLst>
-              <a:ext uri="{FF2B5EF4-FFF2-40B4-BE49-F238E27FC236}">
-                <a16:creationId xmlns:a16="http://schemas.microsoft.com/office/drawing/2014/main" id="{F3E47E41-8DAB-462C-8EC4-B7C30AB34E1A}"/>
-              </a:ext>
-            </a:extLst>
-          </p:cNvPr>
-          <p:cNvSpPr>
-            <a:spLocks noGrp="1"/>
-          </p:cNvSpPr>
-          <p:nvPr>
-            <p:ph idx="1"/>
-          </p:nvPr>
-        </p:nvSpPr>
-        <p:spPr>
-          <a:xfrm>
-            <a:off x="838200" y="1825625"/>
-            <a:ext cx="10515600" cy="4351338"/>
-          </a:xfrm>
-        </p:spPr>
-        <p:txBody>
-          <a:bodyPr>
-            <a:normAutofit/>
+          <a:bodyPr wrap="none" rtlCol="0">
+            <a:spAutoFit/>
           </a:bodyPr>
           <a:lstStyle/>
           <a:p>
-            <a:pPr lvl="0"/>
-            <a:r>
-              <a:rPr lang="pt-BR" sz="4400" dirty="0" err="1">
-                <a:solidFill>
-                  <a:prstClr val="white"/>
-                </a:solidFill>
-              </a:rPr>
-              <a:t>Chocolatey</a:t>
-            </a:r>
-            <a:r>
-              <a:rPr lang="pt-BR" sz="4400" dirty="0">
-                <a:solidFill>
-                  <a:prstClr val="white"/>
-                </a:solidFill>
-              </a:rPr>
-              <a:t> </a:t>
-            </a:r>
-          </a:p>
-          <a:p>
-            <a:pPr lvl="1"/>
-            <a:r>
-              <a:rPr lang="pt-BR" sz="4000" dirty="0">
-                <a:solidFill>
-                  <a:prstClr val="white"/>
-                </a:solidFill>
-              </a:rPr>
-              <a:t>(https://tinyurl.com/hpaeoy8)</a:t>
-            </a:r>
-          </a:p>
-          <a:p>
-            <a:r>
-              <a:rPr lang="pt-BR" sz="4400" dirty="0" err="1">
-                <a:solidFill>
-                  <a:prstClr val="white"/>
-                </a:solidFill>
-              </a:rPr>
-              <a:t>Helm</a:t>
-            </a:r>
-            <a:endParaRPr lang="pt-BR" sz="4400" dirty="0">
+            <a:pPr algn="ctr"/>
+            <a:r>
+              <a:rPr lang="pt-BR" sz="6600" dirty="0">
+                <a:solidFill>
+                  <a:schemeClr val="bg1"/>
+                </a:solidFill>
+              </a:rPr>
+              <a:t>GITHUB</a:t>
+            </a:r>
+          </a:p>
+          <a:p>
+            <a:pPr algn="ctr"/>
+            <a:r>
+              <a:rPr lang="en-US" sz="6600" b="1" dirty="0">
+                <a:solidFill>
+                  <a:schemeClr val="bg1"/>
+                </a:solidFill>
+              </a:rPr>
+              <a:t>https://tinyurl.com/yyklr2m8</a:t>
+            </a:r>
+            <a:endParaRPr lang="en-US" sz="6600" dirty="0">
               <a:solidFill>
-                <a:prstClr val="white"/>
-              </a:solidFill>
-            </a:endParaRPr>
-          </a:p>
-          <a:p>
-            <a:pPr lvl="1"/>
-            <a:r>
-              <a:rPr lang="pt-BR" sz="4000" dirty="0">
-                <a:solidFill>
-                  <a:prstClr val="white"/>
-                </a:solidFill>
-              </a:rPr>
-              <a:t>(https://tinyurl.com/y4a6pnkd)</a:t>
-            </a:r>
-          </a:p>
-          <a:p>
-            <a:pPr lvl="0"/>
-            <a:r>
-              <a:rPr lang="pt-BR" sz="4400" dirty="0" err="1">
-                <a:solidFill>
-                  <a:prstClr val="white"/>
-                </a:solidFill>
-              </a:rPr>
-              <a:t>VirtualBox</a:t>
-            </a:r>
-            <a:r>
-              <a:rPr lang="pt-BR" sz="4400" dirty="0">
-                <a:solidFill>
-                  <a:prstClr val="white"/>
-                </a:solidFill>
-              </a:rPr>
-              <a:t> ou </a:t>
-            </a:r>
-            <a:r>
-              <a:rPr lang="pt-BR" sz="4400" dirty="0" err="1">
-                <a:solidFill>
-                  <a:prstClr val="white"/>
-                </a:solidFill>
-              </a:rPr>
-              <a:t>Hyper</a:t>
-            </a:r>
-            <a:r>
-              <a:rPr lang="pt-BR" sz="4400" dirty="0">
-                <a:solidFill>
-                  <a:prstClr val="white"/>
-                </a:solidFill>
-              </a:rPr>
-              <a:t>-V</a:t>
-            </a:r>
-          </a:p>
-          <a:p>
-            <a:pPr lvl="1"/>
-            <a:r>
-              <a:rPr lang="pt-BR" sz="4000" dirty="0">
-                <a:solidFill>
-                  <a:prstClr val="white"/>
-                </a:solidFill>
-              </a:rPr>
-              <a:t>(https://tinyurl.com/5vgw4mp) </a:t>
-            </a:r>
-          </a:p>
-          <a:p>
-            <a:pPr lvl="0"/>
-            <a:endParaRPr lang="pt-BR" dirty="0">
-              <a:solidFill>
-                <a:prstClr val="white"/>
+                <a:schemeClr val="bg1"/>
               </a:solidFill>
             </a:endParaRPr>
           </a:p>
@@ -6770,702 +6347,7 @@
     </p:spTree>
     <p:extLst>
       <p:ext uri="{BB962C8B-B14F-4D97-AF65-F5344CB8AC3E}">
-        <p14:creationId xmlns:p14="http://schemas.microsoft.com/office/powerpoint/2010/main" val="422698576"/>
-      </p:ext>
-    </p:extLst>
-  </p:cSld>
-  <p:clrMapOvr>
-    <a:masterClrMapping/>
-  </p:clrMapOvr>
-</p:sld>
-</file>
-
-<file path=ppt/slides/slide8.xml><?xml version="1.0" encoding="utf-8"?>
-<p:sld xmlns:a="http://schemas.openxmlformats.org/drawingml/2006/main" xmlns:r="http://schemas.openxmlformats.org/officeDocument/2006/relationships" xmlns:p="http://schemas.openxmlformats.org/presentationml/2006/main">
-  <p:cSld>
-    <p:spTree>
-      <p:nvGrpSpPr>
-        <p:cNvPr id="1" name=""/>
-        <p:cNvGrpSpPr/>
-        <p:nvPr/>
-      </p:nvGrpSpPr>
-      <p:grpSpPr>
-        <a:xfrm>
-          <a:off x="0" y="0"/>
-          <a:ext cx="0" cy="0"/>
-          <a:chOff x="0" y="0"/>
-          <a:chExt cx="0" cy="0"/>
-        </a:xfrm>
-      </p:grpSpPr>
-      <p:sp>
-        <p:nvSpPr>
-          <p:cNvPr id="2" name="Título 1">
-            <a:extLst>
-              <a:ext uri="{FF2B5EF4-FFF2-40B4-BE49-F238E27FC236}">
-                <a16:creationId xmlns:a16="http://schemas.microsoft.com/office/drawing/2014/main" id="{E5DAA8A7-9FBB-45A5-B17D-50B6E548427F}"/>
-              </a:ext>
-            </a:extLst>
-          </p:cNvPr>
-          <p:cNvSpPr>
-            <a:spLocks noGrp="1"/>
-          </p:cNvSpPr>
-          <p:nvPr>
-            <p:ph type="title"/>
-          </p:nvPr>
-        </p:nvSpPr>
-        <p:spPr>
-          <a:xfrm>
-            <a:off x="838200" y="365125"/>
-            <a:ext cx="10515600" cy="1325563"/>
-          </a:xfrm>
-        </p:spPr>
-        <p:txBody>
-          <a:bodyPr/>
-          <a:lstStyle/>
-          <a:p>
-            <a:r>
-              <a:rPr lang="pt-BR" dirty="0">
-                <a:solidFill>
-                  <a:schemeClr val="bg1"/>
-                </a:solidFill>
-                <a:latin typeface="Arial Black" panose="020B0A04020102020204" pitchFamily="34" charset="0"/>
-              </a:rPr>
-              <a:t>Instalando o </a:t>
-            </a:r>
-            <a:r>
-              <a:rPr lang="pt-BR" dirty="0" err="1">
-                <a:solidFill>
-                  <a:schemeClr val="bg1"/>
-                </a:solidFill>
-                <a:latin typeface="Arial Black" panose="020B0A04020102020204" pitchFamily="34" charset="0"/>
-              </a:rPr>
-              <a:t>minikube</a:t>
-            </a:r>
-            <a:endParaRPr lang="en-US" dirty="0"/>
-          </a:p>
-        </p:txBody>
-      </p:sp>
-      <p:sp>
-        <p:nvSpPr>
-          <p:cNvPr id="3" name="Espaço Reservado para Conteúdo 2">
-            <a:extLst>
-              <a:ext uri="{FF2B5EF4-FFF2-40B4-BE49-F238E27FC236}">
-                <a16:creationId xmlns:a16="http://schemas.microsoft.com/office/drawing/2014/main" id="{5789BAAD-C8E1-41BB-90C1-354786C983E1}"/>
-              </a:ext>
-            </a:extLst>
-          </p:cNvPr>
-          <p:cNvSpPr>
-            <a:spLocks noGrp="1"/>
-          </p:cNvSpPr>
-          <p:nvPr>
-            <p:ph idx="1"/>
-          </p:nvPr>
-        </p:nvSpPr>
-        <p:spPr>
-          <a:xfrm>
-            <a:off x="838200" y="1825625"/>
-            <a:ext cx="10515600" cy="4351338"/>
-          </a:xfrm>
-        </p:spPr>
-        <p:txBody>
-          <a:bodyPr>
-            <a:normAutofit fontScale="85000" lnSpcReduction="10000"/>
-          </a:bodyPr>
-          <a:lstStyle/>
-          <a:p>
-            <a:pPr lvl="0"/>
-            <a:r>
-              <a:rPr lang="pt-BR" sz="4400" dirty="0">
-                <a:solidFill>
-                  <a:prstClr val="white"/>
-                </a:solidFill>
-              </a:rPr>
-              <a:t>$ choco </a:t>
-            </a:r>
-            <a:r>
-              <a:rPr lang="pt-BR" sz="4400" dirty="0" err="1">
-                <a:solidFill>
-                  <a:prstClr val="white"/>
-                </a:solidFill>
-              </a:rPr>
-              <a:t>install</a:t>
-            </a:r>
-            <a:r>
-              <a:rPr lang="pt-BR" sz="4400" dirty="0">
-                <a:solidFill>
-                  <a:prstClr val="white"/>
-                </a:solidFill>
-              </a:rPr>
-              <a:t> </a:t>
-            </a:r>
-            <a:r>
-              <a:rPr lang="pt-BR" sz="4400" dirty="0" err="1">
-                <a:solidFill>
-                  <a:prstClr val="white"/>
-                </a:solidFill>
-              </a:rPr>
-              <a:t>kubernetes-cli</a:t>
-            </a:r>
-            <a:endParaRPr lang="pt-BR" sz="4400" dirty="0">
-              <a:solidFill>
-                <a:prstClr val="white"/>
-              </a:solidFill>
-            </a:endParaRPr>
-          </a:p>
-          <a:p>
-            <a:pPr lvl="0"/>
-            <a:r>
-              <a:rPr lang="pt-BR" sz="4400" dirty="0">
-                <a:solidFill>
-                  <a:prstClr val="white"/>
-                </a:solidFill>
-              </a:rPr>
-              <a:t>$ choco </a:t>
-            </a:r>
-            <a:r>
-              <a:rPr lang="pt-BR" sz="4400" dirty="0" err="1">
-                <a:solidFill>
-                  <a:prstClr val="white"/>
-                </a:solidFill>
-              </a:rPr>
-              <a:t>install</a:t>
-            </a:r>
-            <a:r>
-              <a:rPr lang="pt-BR" sz="4400" dirty="0">
-                <a:solidFill>
-                  <a:prstClr val="white"/>
-                </a:solidFill>
-              </a:rPr>
-              <a:t> </a:t>
-            </a:r>
-            <a:r>
-              <a:rPr lang="pt-BR" sz="4400" dirty="0" err="1">
-                <a:solidFill>
-                  <a:prstClr val="white"/>
-                </a:solidFill>
-              </a:rPr>
-              <a:t>minikube</a:t>
-            </a:r>
-            <a:endParaRPr lang="pt-BR" sz="4400" dirty="0">
-              <a:solidFill>
-                <a:prstClr val="white"/>
-              </a:solidFill>
-            </a:endParaRPr>
-          </a:p>
-          <a:p>
-            <a:pPr lvl="0"/>
-            <a:r>
-              <a:rPr lang="pt-BR" sz="4400" dirty="0">
-                <a:solidFill>
-                  <a:prstClr val="white"/>
-                </a:solidFill>
-              </a:rPr>
-              <a:t>$ </a:t>
-            </a:r>
-            <a:r>
-              <a:rPr lang="pt-BR" sz="4400" dirty="0" err="1">
-                <a:solidFill>
-                  <a:prstClr val="white"/>
-                </a:solidFill>
-              </a:rPr>
-              <a:t>minikube</a:t>
-            </a:r>
-            <a:r>
-              <a:rPr lang="pt-BR" sz="4400" dirty="0">
-                <a:solidFill>
-                  <a:prstClr val="white"/>
-                </a:solidFill>
-              </a:rPr>
-              <a:t> </a:t>
-            </a:r>
-            <a:r>
-              <a:rPr lang="pt-BR" sz="4400" dirty="0" err="1">
-                <a:solidFill>
-                  <a:prstClr val="white"/>
-                </a:solidFill>
-              </a:rPr>
-              <a:t>config</a:t>
-            </a:r>
-            <a:r>
-              <a:rPr lang="pt-BR" sz="4400" dirty="0">
-                <a:solidFill>
-                  <a:prstClr val="white"/>
-                </a:solidFill>
-              </a:rPr>
-              <a:t> set </a:t>
-            </a:r>
-            <a:r>
-              <a:rPr lang="pt-BR" sz="4400" dirty="0" err="1">
-                <a:solidFill>
-                  <a:prstClr val="white"/>
-                </a:solidFill>
-              </a:rPr>
-              <a:t>kubernetes-version</a:t>
-            </a:r>
-            <a:r>
-              <a:rPr lang="pt-BR" sz="4400" dirty="0">
-                <a:solidFill>
-                  <a:prstClr val="white"/>
-                </a:solidFill>
-              </a:rPr>
-              <a:t> v1.15.3</a:t>
-            </a:r>
-          </a:p>
-          <a:p>
-            <a:r>
-              <a:rPr lang="pt-BR" sz="4400" dirty="0">
-                <a:solidFill>
-                  <a:prstClr val="white"/>
-                </a:solidFill>
-              </a:rPr>
-              <a:t>$ </a:t>
-            </a:r>
-            <a:r>
-              <a:rPr lang="pt-BR" sz="4400" dirty="0" err="1">
-                <a:solidFill>
-                  <a:prstClr val="white"/>
-                </a:solidFill>
-              </a:rPr>
-              <a:t>minikube</a:t>
-            </a:r>
-            <a:r>
-              <a:rPr lang="pt-BR" sz="4400" dirty="0">
-                <a:solidFill>
-                  <a:prstClr val="white"/>
-                </a:solidFill>
-              </a:rPr>
-              <a:t> start</a:t>
-            </a:r>
-          </a:p>
-          <a:p>
-            <a:pPr lvl="1"/>
-            <a:r>
-              <a:rPr lang="pt-BR" sz="4000" dirty="0" err="1">
-                <a:solidFill>
-                  <a:prstClr val="white"/>
-                </a:solidFill>
-              </a:rPr>
-              <a:t>Hyper</a:t>
-            </a:r>
-            <a:r>
-              <a:rPr lang="pt-BR" sz="4000" dirty="0">
-                <a:solidFill>
-                  <a:prstClr val="white"/>
-                </a:solidFill>
-              </a:rPr>
-              <a:t>-V</a:t>
-            </a:r>
-          </a:p>
-          <a:p>
-            <a:pPr lvl="2"/>
-            <a:r>
-              <a:rPr lang="pt-BR" sz="3600" dirty="0">
-                <a:solidFill>
-                  <a:prstClr val="white"/>
-                </a:solidFill>
-              </a:rPr>
-              <a:t>$ </a:t>
-            </a:r>
-            <a:r>
-              <a:rPr lang="pt-BR" sz="3600" dirty="0" err="1">
-                <a:solidFill>
-                  <a:prstClr val="white"/>
-                </a:solidFill>
-              </a:rPr>
-              <a:t>minikube</a:t>
-            </a:r>
-            <a:r>
-              <a:rPr lang="pt-BR" sz="3600" dirty="0">
-                <a:solidFill>
-                  <a:prstClr val="white"/>
-                </a:solidFill>
-              </a:rPr>
-              <a:t> start --</a:t>
-            </a:r>
-            <a:r>
-              <a:rPr lang="pt-BR" sz="3600" dirty="0" err="1">
-                <a:solidFill>
-                  <a:prstClr val="white"/>
-                </a:solidFill>
-              </a:rPr>
-              <a:t>vm</a:t>
-            </a:r>
-            <a:r>
-              <a:rPr lang="pt-BR" sz="3600" dirty="0">
-                <a:solidFill>
-                  <a:prstClr val="white"/>
-                </a:solidFill>
-              </a:rPr>
-              <a:t>-driver </a:t>
-            </a:r>
-            <a:r>
-              <a:rPr lang="pt-BR" sz="3600" dirty="0" err="1">
-                <a:solidFill>
-                  <a:prstClr val="white"/>
-                </a:solidFill>
-              </a:rPr>
-              <a:t>hyperv</a:t>
-            </a:r>
-            <a:r>
-              <a:rPr lang="pt-BR" sz="3600" dirty="0">
-                <a:solidFill>
-                  <a:prstClr val="white"/>
-                </a:solidFill>
-              </a:rPr>
-              <a:t> --</a:t>
-            </a:r>
-            <a:r>
-              <a:rPr lang="pt-BR" sz="3600" dirty="0" err="1">
-                <a:solidFill>
-                  <a:prstClr val="white"/>
-                </a:solidFill>
-              </a:rPr>
-              <a:t>hyperv</a:t>
-            </a:r>
-            <a:r>
-              <a:rPr lang="pt-BR" sz="3600" dirty="0">
-                <a:solidFill>
-                  <a:prstClr val="white"/>
-                </a:solidFill>
-              </a:rPr>
-              <a:t>-virtual-switch "</a:t>
-            </a:r>
-            <a:r>
-              <a:rPr lang="pt-BR" sz="3600" dirty="0" err="1">
-                <a:solidFill>
-                  <a:prstClr val="white"/>
-                </a:solidFill>
-              </a:rPr>
-              <a:t>minikube_switch</a:t>
-            </a:r>
-            <a:r>
-              <a:rPr lang="pt-BR" sz="3600" dirty="0">
-                <a:solidFill>
-                  <a:prstClr val="white"/>
-                </a:solidFill>
-              </a:rPr>
-              <a:t>”</a:t>
-            </a:r>
-          </a:p>
-          <a:p>
-            <a:r>
-              <a:rPr lang="pt-BR" sz="4400" dirty="0">
-                <a:solidFill>
-                  <a:prstClr val="white"/>
-                </a:solidFill>
-              </a:rPr>
-              <a:t>$ </a:t>
-            </a:r>
-            <a:r>
-              <a:rPr lang="pt-BR" sz="4400" dirty="0" err="1">
-                <a:solidFill>
-                  <a:prstClr val="white"/>
-                </a:solidFill>
-              </a:rPr>
-              <a:t>minikube</a:t>
-            </a:r>
-            <a:r>
-              <a:rPr lang="pt-BR" sz="4400" dirty="0">
-                <a:solidFill>
-                  <a:prstClr val="white"/>
-                </a:solidFill>
-              </a:rPr>
-              <a:t> status</a:t>
-            </a:r>
-            <a:endParaRPr lang="pt-BR" sz="5200" dirty="0">
-              <a:solidFill>
-                <a:prstClr val="white"/>
-              </a:solidFill>
-            </a:endParaRPr>
-          </a:p>
-          <a:p>
-            <a:pPr lvl="0"/>
-            <a:endParaRPr lang="pt-BR" dirty="0">
-              <a:solidFill>
-                <a:prstClr val="white"/>
-              </a:solidFill>
-            </a:endParaRPr>
-          </a:p>
-        </p:txBody>
-      </p:sp>
-    </p:spTree>
-    <p:extLst>
-      <p:ext uri="{BB962C8B-B14F-4D97-AF65-F5344CB8AC3E}">
-        <p14:creationId xmlns:p14="http://schemas.microsoft.com/office/powerpoint/2010/main" val="2479813902"/>
-      </p:ext>
-    </p:extLst>
-  </p:cSld>
-  <p:clrMapOvr>
-    <a:masterClrMapping/>
-  </p:clrMapOvr>
-</p:sld>
-</file>
-
-<file path=ppt/slides/slide9.xml><?xml version="1.0" encoding="utf-8"?>
-<p:sld xmlns:a="http://schemas.openxmlformats.org/drawingml/2006/main" xmlns:r="http://schemas.openxmlformats.org/officeDocument/2006/relationships" xmlns:p="http://schemas.openxmlformats.org/presentationml/2006/main">
-  <p:cSld>
-    <p:spTree>
-      <p:nvGrpSpPr>
-        <p:cNvPr id="1" name=""/>
-        <p:cNvGrpSpPr/>
-        <p:nvPr/>
-      </p:nvGrpSpPr>
-      <p:grpSpPr>
-        <a:xfrm>
-          <a:off x="0" y="0"/>
-          <a:ext cx="0" cy="0"/>
-          <a:chOff x="0" y="0"/>
-          <a:chExt cx="0" cy="0"/>
-        </a:xfrm>
-      </p:grpSpPr>
-      <p:sp>
-        <p:nvSpPr>
-          <p:cNvPr id="2" name="Título 1">
-            <a:extLst>
-              <a:ext uri="{FF2B5EF4-FFF2-40B4-BE49-F238E27FC236}">
-                <a16:creationId xmlns:a16="http://schemas.microsoft.com/office/drawing/2014/main" id="{ED162665-8266-4270-B057-FBD11C353B65}"/>
-              </a:ext>
-            </a:extLst>
-          </p:cNvPr>
-          <p:cNvSpPr>
-            <a:spLocks noGrp="1"/>
-          </p:cNvSpPr>
-          <p:nvPr>
-            <p:ph type="title"/>
-          </p:nvPr>
-        </p:nvSpPr>
-        <p:spPr>
-          <a:xfrm>
-            <a:off x="838200" y="365125"/>
-            <a:ext cx="10515600" cy="1325563"/>
-          </a:xfrm>
-        </p:spPr>
-        <p:txBody>
-          <a:bodyPr/>
-          <a:lstStyle/>
-          <a:p>
-            <a:r>
-              <a:rPr lang="pt-BR" dirty="0">
-                <a:solidFill>
-                  <a:schemeClr val="bg1"/>
-                </a:solidFill>
-                <a:latin typeface="Arial Black" panose="020B0A04020102020204" pitchFamily="34" charset="0"/>
-              </a:rPr>
-              <a:t>Habilitando </a:t>
-            </a:r>
-            <a:r>
-              <a:rPr lang="pt-BR" dirty="0" err="1">
-                <a:solidFill>
-                  <a:schemeClr val="bg1"/>
-                </a:solidFill>
-                <a:latin typeface="Arial Black" panose="020B0A04020102020204" pitchFamily="34" charset="0"/>
-              </a:rPr>
-              <a:t>helm</a:t>
-            </a:r>
-            <a:endParaRPr lang="en-US" dirty="0"/>
-          </a:p>
-        </p:txBody>
-      </p:sp>
-      <p:sp>
-        <p:nvSpPr>
-          <p:cNvPr id="3" name="Espaço Reservado para Conteúdo 2">
-            <a:extLst>
-              <a:ext uri="{FF2B5EF4-FFF2-40B4-BE49-F238E27FC236}">
-                <a16:creationId xmlns:a16="http://schemas.microsoft.com/office/drawing/2014/main" id="{B42BBD46-2229-4B50-8691-89C3262748E3}"/>
-              </a:ext>
-            </a:extLst>
-          </p:cNvPr>
-          <p:cNvSpPr>
-            <a:spLocks noGrp="1"/>
-          </p:cNvSpPr>
-          <p:nvPr>
-            <p:ph idx="1"/>
-          </p:nvPr>
-        </p:nvSpPr>
-        <p:spPr>
-          <a:xfrm>
-            <a:off x="838200" y="1825625"/>
-            <a:ext cx="10515600" cy="4351338"/>
-          </a:xfrm>
-        </p:spPr>
-        <p:txBody>
-          <a:bodyPr>
-            <a:normAutofit/>
-          </a:bodyPr>
-          <a:lstStyle/>
-          <a:p>
-            <a:r>
-              <a:rPr lang="pt-BR" sz="4400" dirty="0">
-                <a:solidFill>
-                  <a:prstClr val="white"/>
-                </a:solidFill>
-              </a:rPr>
-              <a:t>$ choco </a:t>
-            </a:r>
-            <a:r>
-              <a:rPr lang="pt-BR" sz="4400" dirty="0" err="1">
-                <a:solidFill>
-                  <a:prstClr val="white"/>
-                </a:solidFill>
-              </a:rPr>
-              <a:t>install</a:t>
-            </a:r>
-            <a:r>
-              <a:rPr lang="pt-BR" sz="4400" dirty="0">
-                <a:solidFill>
-                  <a:prstClr val="white"/>
-                </a:solidFill>
-              </a:rPr>
-              <a:t> </a:t>
-            </a:r>
-            <a:r>
-              <a:rPr lang="pt-BR" sz="4400" dirty="0" err="1">
-                <a:solidFill>
-                  <a:prstClr val="white"/>
-                </a:solidFill>
-              </a:rPr>
-              <a:t>kubernetes-helm</a:t>
-            </a:r>
-            <a:endParaRPr lang="pt-BR" sz="4400" dirty="0">
-              <a:solidFill>
-                <a:prstClr val="white"/>
-              </a:solidFill>
-            </a:endParaRPr>
-          </a:p>
-          <a:p>
-            <a:r>
-              <a:rPr lang="pt-BR" sz="4400" dirty="0">
-                <a:solidFill>
-                  <a:prstClr val="white"/>
-                </a:solidFill>
-              </a:rPr>
-              <a:t>$ </a:t>
-            </a:r>
-            <a:r>
-              <a:rPr lang="pt-BR" sz="4400" dirty="0" err="1">
-                <a:solidFill>
-                  <a:prstClr val="white"/>
-                </a:solidFill>
-              </a:rPr>
-              <a:t>helm</a:t>
-            </a:r>
-            <a:r>
-              <a:rPr lang="pt-BR" sz="4400" dirty="0">
-                <a:solidFill>
-                  <a:prstClr val="white"/>
-                </a:solidFill>
-              </a:rPr>
-              <a:t> </a:t>
-            </a:r>
-            <a:r>
-              <a:rPr lang="pt-BR" sz="4400" dirty="0" err="1">
-                <a:solidFill>
-                  <a:prstClr val="white"/>
-                </a:solidFill>
-              </a:rPr>
-              <a:t>init</a:t>
-            </a:r>
-            <a:endParaRPr lang="pt-BR" sz="4400" dirty="0">
-              <a:solidFill>
-                <a:prstClr val="white"/>
-              </a:solidFill>
-            </a:endParaRPr>
-          </a:p>
-          <a:p>
-            <a:r>
-              <a:rPr lang="pt-BR" sz="4400" dirty="0">
-                <a:solidFill>
-                  <a:prstClr val="white"/>
-                </a:solidFill>
-              </a:rPr>
-              <a:t>$ </a:t>
-            </a:r>
-            <a:r>
-              <a:rPr lang="pt-BR" sz="4400" dirty="0" err="1">
-                <a:solidFill>
-                  <a:prstClr val="white"/>
-                </a:solidFill>
-              </a:rPr>
-              <a:t>helm</a:t>
-            </a:r>
-            <a:r>
-              <a:rPr lang="pt-BR" sz="4400" dirty="0">
-                <a:solidFill>
-                  <a:prstClr val="white"/>
-                </a:solidFill>
-              </a:rPr>
-              <a:t> </a:t>
-            </a:r>
-            <a:r>
-              <a:rPr lang="pt-BR" sz="4400" dirty="0" err="1">
-                <a:solidFill>
-                  <a:prstClr val="white"/>
-                </a:solidFill>
-              </a:rPr>
-              <a:t>repo</a:t>
-            </a:r>
-            <a:r>
-              <a:rPr lang="pt-BR" sz="4400" dirty="0">
-                <a:solidFill>
-                  <a:prstClr val="white"/>
-                </a:solidFill>
-              </a:rPr>
-              <a:t> </a:t>
-            </a:r>
-            <a:r>
-              <a:rPr lang="pt-BR" sz="4400" dirty="0" err="1">
-                <a:solidFill>
-                  <a:prstClr val="white"/>
-                </a:solidFill>
-              </a:rPr>
-              <a:t>add</a:t>
-            </a:r>
-            <a:r>
-              <a:rPr lang="pt-BR" sz="4400" dirty="0">
-                <a:solidFill>
-                  <a:prstClr val="white"/>
-                </a:solidFill>
-              </a:rPr>
-              <a:t> </a:t>
-            </a:r>
-            <a:r>
-              <a:rPr lang="pt-BR" sz="4400" dirty="0" err="1">
-                <a:solidFill>
-                  <a:prstClr val="white"/>
-                </a:solidFill>
-              </a:rPr>
-              <a:t>stable</a:t>
-            </a:r>
-            <a:r>
-              <a:rPr lang="pt-BR" sz="4400" dirty="0">
-                <a:solidFill>
-                  <a:prstClr val="white"/>
-                </a:solidFill>
-              </a:rPr>
-              <a:t> https://kubernetes-charts.storage.googleapis.com/</a:t>
-            </a:r>
-          </a:p>
-          <a:p>
-            <a:endParaRPr lang="pt-BR" sz="4400" dirty="0">
-              <a:solidFill>
-                <a:prstClr val="white"/>
-              </a:solidFill>
-            </a:endParaRPr>
-          </a:p>
-          <a:p>
-            <a:pPr lvl="0"/>
-            <a:endParaRPr lang="pt-BR" dirty="0">
-              <a:solidFill>
-                <a:prstClr val="white"/>
-              </a:solidFill>
-            </a:endParaRPr>
-          </a:p>
-        </p:txBody>
-      </p:sp>
-    </p:spTree>
-    <p:extLst>
-      <p:ext uri="{BB962C8B-B14F-4D97-AF65-F5344CB8AC3E}">
-        <p14:creationId xmlns:p14="http://schemas.microsoft.com/office/powerpoint/2010/main" val="3759894044"/>
+        <p14:creationId xmlns:p14="http://schemas.microsoft.com/office/powerpoint/2010/main" val="2364908228"/>
       </p:ext>
     </p:extLst>
   </p:cSld>

</xml_diff>